<commit_message>
docs and logo updates
</commit_message>
<xml_diff>
--- a/docs/payload_info_tag.pptx
+++ b/docs/payload_info_tag.pptx
@@ -4,11 +4,15 @@
   <p:sldMasterIdLst>
     <p:sldMasterId id="2147483648" r:id="rId1"/>
   </p:sldMasterIdLst>
+  <p:handoutMasterIdLst>
+    <p:handoutMasterId r:id="rId4"/>
+  </p:handoutMasterIdLst>
   <p:sldIdLst>
     <p:sldId id="256" r:id="rId2"/>
+    <p:sldId id="257" r:id="rId3"/>
   </p:sldIdLst>
   <p:sldSz cx="12192000" cy="6858000"/>
-  <p:notesSz cx="6797675" cy="9926638"/>
+  <p:notesSz cx="9926638" cy="6797675"/>
   <p:defaultTextStyle>
     <a:defPPr>
       <a:defRPr lang="pt-PT"/>
@@ -104,7 +108,177 @@
       </a:defRPr>
     </a:lvl9pPr>
   </p:defaultTextStyle>
+  <p:extLst>
+    <p:ext uri="{EFAFB233-063F-42B5-8137-9DF3F51BA10A}">
+      <p15:sldGuideLst xmlns:p15="http://schemas.microsoft.com/office/powerpoint/2012/main"/>
+    </p:ext>
+  </p:extLst>
 </p:presentation>
+</file>
+
+<file path=ppt/handoutMasters/handoutMaster1.xml><?xml version="1.0" encoding="utf-8"?>
+<p:handoutMaster xmlns:a="http://schemas.openxmlformats.org/drawingml/2006/main" xmlns:r="http://schemas.openxmlformats.org/officeDocument/2006/relationships" xmlns:p="http://schemas.openxmlformats.org/presentationml/2006/main">
+  <p:cSld>
+    <p:bg>
+      <p:bgRef idx="1001">
+        <a:schemeClr val="bg1"/>
+      </p:bgRef>
+    </p:bg>
+    <p:spTree>
+      <p:nvGrpSpPr>
+        <p:cNvPr id="1" name=""/>
+        <p:cNvGrpSpPr/>
+        <p:nvPr/>
+      </p:nvGrpSpPr>
+      <p:grpSpPr>
+        <a:xfrm>
+          <a:off x="0" y="0"/>
+          <a:ext cx="0" cy="0"/>
+          <a:chOff x="0" y="0"/>
+          <a:chExt cx="0" cy="0"/>
+        </a:xfrm>
+      </p:grpSpPr>
+      <p:sp>
+        <p:nvSpPr>
+          <p:cNvPr id="2" name="Header Placeholder 1"/>
+          <p:cNvSpPr>
+            <a:spLocks noGrp="1"/>
+          </p:cNvSpPr>
+          <p:nvPr>
+            <p:ph type="hdr" sz="quarter"/>
+          </p:nvPr>
+        </p:nvSpPr>
+        <p:spPr>
+          <a:xfrm>
+            <a:off x="0" y="0"/>
+            <a:ext cx="4302625" cy="340265"/>
+          </a:xfrm>
+          <a:prstGeom prst="rect">
+            <a:avLst/>
+          </a:prstGeom>
+        </p:spPr>
+        <p:txBody>
+          <a:bodyPr vert="horz" lIns="91440" tIns="45720" rIns="91440" bIns="45720" rtlCol="0"/>
+          <a:lstStyle>
+            <a:lvl1pPr algn="l">
+              <a:defRPr sz="1200"/>
+            </a:lvl1pPr>
+          </a:lstStyle>
+          <a:p>
+            <a:endParaRPr lang="pt-PT"/>
+          </a:p>
+        </p:txBody>
+      </p:sp>
+      <p:sp>
+        <p:nvSpPr>
+          <p:cNvPr id="3" name="Date Placeholder 2"/>
+          <p:cNvSpPr>
+            <a:spLocks noGrp="1"/>
+          </p:cNvSpPr>
+          <p:nvPr>
+            <p:ph type="dt" sz="quarter" idx="1"/>
+          </p:nvPr>
+        </p:nvSpPr>
+        <p:spPr>
+          <a:xfrm>
+            <a:off x="5621696" y="0"/>
+            <a:ext cx="4302625" cy="340265"/>
+          </a:xfrm>
+          <a:prstGeom prst="rect">
+            <a:avLst/>
+          </a:prstGeom>
+        </p:spPr>
+        <p:txBody>
+          <a:bodyPr vert="horz" lIns="91440" tIns="45720" rIns="91440" bIns="45720" rtlCol="0"/>
+          <a:lstStyle>
+            <a:lvl1pPr algn="r">
+              <a:defRPr sz="1200"/>
+            </a:lvl1pPr>
+          </a:lstStyle>
+          <a:p>
+            <a:fld id="{DC4C17E5-4421-4B0E-B046-A55DCDC5EFB4}" type="datetimeFigureOut">
+              <a:rPr lang="pt-PT" smtClean="0"/>
+              <a:t>28/06/2016</a:t>
+            </a:fld>
+            <a:endParaRPr lang="pt-PT"/>
+          </a:p>
+        </p:txBody>
+      </p:sp>
+      <p:sp>
+        <p:nvSpPr>
+          <p:cNvPr id="4" name="Footer Placeholder 3"/>
+          <p:cNvSpPr>
+            <a:spLocks noGrp="1"/>
+          </p:cNvSpPr>
+          <p:nvPr>
+            <p:ph type="ftr" sz="quarter" idx="2"/>
+          </p:nvPr>
+        </p:nvSpPr>
+        <p:spPr>
+          <a:xfrm>
+            <a:off x="0" y="6457410"/>
+            <a:ext cx="4302625" cy="340265"/>
+          </a:xfrm>
+          <a:prstGeom prst="rect">
+            <a:avLst/>
+          </a:prstGeom>
+        </p:spPr>
+        <p:txBody>
+          <a:bodyPr vert="horz" lIns="91440" tIns="45720" rIns="91440" bIns="45720" rtlCol="0" anchor="b"/>
+          <a:lstStyle>
+            <a:lvl1pPr algn="l">
+              <a:defRPr sz="1200"/>
+            </a:lvl1pPr>
+          </a:lstStyle>
+          <a:p>
+            <a:endParaRPr lang="pt-PT"/>
+          </a:p>
+        </p:txBody>
+      </p:sp>
+      <p:sp>
+        <p:nvSpPr>
+          <p:cNvPr id="5" name="Slide Number Placeholder 4"/>
+          <p:cNvSpPr>
+            <a:spLocks noGrp="1"/>
+          </p:cNvSpPr>
+          <p:nvPr>
+            <p:ph type="sldNum" sz="quarter" idx="3"/>
+          </p:nvPr>
+        </p:nvSpPr>
+        <p:spPr>
+          <a:xfrm>
+            <a:off x="5621696" y="6457410"/>
+            <a:ext cx="4302625" cy="340265"/>
+          </a:xfrm>
+          <a:prstGeom prst="rect">
+            <a:avLst/>
+          </a:prstGeom>
+        </p:spPr>
+        <p:txBody>
+          <a:bodyPr vert="horz" lIns="91440" tIns="45720" rIns="91440" bIns="45720" rtlCol="0" anchor="b"/>
+          <a:lstStyle>
+            <a:lvl1pPr algn="r">
+              <a:defRPr sz="1200"/>
+            </a:lvl1pPr>
+          </a:lstStyle>
+          <a:p>
+            <a:fld id="{EBB457B5-FD39-4D83-ABAD-2F3D432E9E9E}" type="slidenum">
+              <a:rPr lang="pt-PT" smtClean="0"/>
+              <a:t>‹#›</a:t>
+            </a:fld>
+            <a:endParaRPr lang="pt-PT"/>
+          </a:p>
+        </p:txBody>
+      </p:sp>
+    </p:spTree>
+    <p:extLst>
+      <p:ext uri="{BB962C8B-B14F-4D97-AF65-F5344CB8AC3E}">
+        <p14:creationId xmlns:p14="http://schemas.microsoft.com/office/powerpoint/2010/main" val="3721743107"/>
+      </p:ext>
+    </p:extLst>
+  </p:cSld>
+  <p:clrMap bg1="lt1" tx1="dk1" bg2="lt2" tx2="dk2" accent1="accent1" accent2="accent2" accent3="accent3" accent4="accent4" accent5="accent5" accent6="accent6" hlink="hlink" folHlink="folHlink"/>
+</p:handoutMaster>
 </file>
 
 <file path=ppt/slideLayouts/slideLayout1.xml><?xml version="1.0" encoding="utf-8"?>
@@ -238,7 +412,7 @@
           <a:p>
             <a:fld id="{F2AA6E9C-9EE9-4073-BD8A-9EC2E4169C09}" type="datetimeFigureOut">
               <a:rPr lang="pt-PT" smtClean="0"/>
-              <a:t>26/06/2016</a:t>
+              <a:t>28/06/2016</a:t>
             </a:fld>
             <a:endParaRPr lang="pt-PT"/>
           </a:p>
@@ -408,7 +582,7 @@
           <a:p>
             <a:fld id="{F2AA6E9C-9EE9-4073-BD8A-9EC2E4169C09}" type="datetimeFigureOut">
               <a:rPr lang="pt-PT" smtClean="0"/>
-              <a:t>26/06/2016</a:t>
+              <a:t>28/06/2016</a:t>
             </a:fld>
             <a:endParaRPr lang="pt-PT"/>
           </a:p>
@@ -588,7 +762,7 @@
           <a:p>
             <a:fld id="{F2AA6E9C-9EE9-4073-BD8A-9EC2E4169C09}" type="datetimeFigureOut">
               <a:rPr lang="pt-PT" smtClean="0"/>
-              <a:t>26/06/2016</a:t>
+              <a:t>28/06/2016</a:t>
             </a:fld>
             <a:endParaRPr lang="pt-PT"/>
           </a:p>
@@ -758,7 +932,7 @@
           <a:p>
             <a:fld id="{F2AA6E9C-9EE9-4073-BD8A-9EC2E4169C09}" type="datetimeFigureOut">
               <a:rPr lang="pt-PT" smtClean="0"/>
-              <a:t>26/06/2016</a:t>
+              <a:t>28/06/2016</a:t>
             </a:fld>
             <a:endParaRPr lang="pt-PT"/>
           </a:p>
@@ -1004,7 +1178,7 @@
           <a:p>
             <a:fld id="{F2AA6E9C-9EE9-4073-BD8A-9EC2E4169C09}" type="datetimeFigureOut">
               <a:rPr lang="pt-PT" smtClean="0"/>
-              <a:t>26/06/2016</a:t>
+              <a:t>28/06/2016</a:t>
             </a:fld>
             <a:endParaRPr lang="pt-PT"/>
           </a:p>
@@ -1236,7 +1410,7 @@
           <a:p>
             <a:fld id="{F2AA6E9C-9EE9-4073-BD8A-9EC2E4169C09}" type="datetimeFigureOut">
               <a:rPr lang="pt-PT" smtClean="0"/>
-              <a:t>26/06/2016</a:t>
+              <a:t>28/06/2016</a:t>
             </a:fld>
             <a:endParaRPr lang="pt-PT"/>
           </a:p>
@@ -1603,7 +1777,7 @@
           <a:p>
             <a:fld id="{F2AA6E9C-9EE9-4073-BD8A-9EC2E4169C09}" type="datetimeFigureOut">
               <a:rPr lang="pt-PT" smtClean="0"/>
-              <a:t>26/06/2016</a:t>
+              <a:t>28/06/2016</a:t>
             </a:fld>
             <a:endParaRPr lang="pt-PT"/>
           </a:p>
@@ -1721,7 +1895,7 @@
           <a:p>
             <a:fld id="{F2AA6E9C-9EE9-4073-BD8A-9EC2E4169C09}" type="datetimeFigureOut">
               <a:rPr lang="pt-PT" smtClean="0"/>
-              <a:t>26/06/2016</a:t>
+              <a:t>28/06/2016</a:t>
             </a:fld>
             <a:endParaRPr lang="pt-PT"/>
           </a:p>
@@ -1816,7 +1990,7 @@
           <a:p>
             <a:fld id="{F2AA6E9C-9EE9-4073-BD8A-9EC2E4169C09}" type="datetimeFigureOut">
               <a:rPr lang="pt-PT" smtClean="0"/>
-              <a:t>26/06/2016</a:t>
+              <a:t>28/06/2016</a:t>
             </a:fld>
             <a:endParaRPr lang="pt-PT"/>
           </a:p>
@@ -2093,7 +2267,7 @@
           <a:p>
             <a:fld id="{F2AA6E9C-9EE9-4073-BD8A-9EC2E4169C09}" type="datetimeFigureOut">
               <a:rPr lang="pt-PT" smtClean="0"/>
-              <a:t>26/06/2016</a:t>
+              <a:t>28/06/2016</a:t>
             </a:fld>
             <a:endParaRPr lang="pt-PT"/>
           </a:p>
@@ -2346,7 +2520,7 @@
           <a:p>
             <a:fld id="{F2AA6E9C-9EE9-4073-BD8A-9EC2E4169C09}" type="datetimeFigureOut">
               <a:rPr lang="pt-PT" smtClean="0"/>
-              <a:t>26/06/2016</a:t>
+              <a:t>28/06/2016</a:t>
             </a:fld>
             <a:endParaRPr lang="pt-PT"/>
           </a:p>
@@ -2559,7 +2733,7 @@
           <a:p>
             <a:fld id="{F2AA6E9C-9EE9-4073-BD8A-9EC2E4169C09}" type="datetimeFigureOut">
               <a:rPr lang="pt-PT" smtClean="0"/>
-              <a:t>26/06/2016</a:t>
+              <a:t>28/06/2016</a:t>
             </a:fld>
             <a:endParaRPr lang="pt-PT"/>
           </a:p>
@@ -3525,6 +3699,84 @@
 </p:sld>
 </file>
 
+<file path=ppt/slides/slide2.xml><?xml version="1.0" encoding="utf-8"?>
+<p:sld xmlns:a="http://schemas.openxmlformats.org/drawingml/2006/main" xmlns:r="http://schemas.openxmlformats.org/officeDocument/2006/relationships" xmlns:p="http://schemas.openxmlformats.org/presentationml/2006/main">
+  <p:cSld>
+    <p:spTree>
+      <p:nvGrpSpPr>
+        <p:cNvPr id="1" name=""/>
+        <p:cNvGrpSpPr/>
+        <p:nvPr/>
+      </p:nvGrpSpPr>
+      <p:grpSpPr>
+        <a:xfrm>
+          <a:off x="0" y="0"/>
+          <a:ext cx="0" cy="0"/>
+          <a:chOff x="0" y="0"/>
+          <a:chExt cx="0" cy="0"/>
+        </a:xfrm>
+      </p:grpSpPr>
+      <p:pic>
+        <p:nvPicPr>
+          <p:cNvPr id="3" name="Picture 2"/>
+          <p:cNvPicPr>
+            <a:picLocks noChangeAspect="1"/>
+          </p:cNvPicPr>
+          <p:nvPr/>
+        </p:nvPicPr>
+        <p:blipFill>
+          <a:blip r:embed="rId2"/>
+          <a:stretch>
+            <a:fillRect/>
+          </a:stretch>
+        </p:blipFill>
+        <p:spPr>
+          <a:xfrm>
+            <a:off x="2884800" y="3589867"/>
+            <a:ext cx="5696754" cy="3115734"/>
+          </a:xfrm>
+          <a:prstGeom prst="rect">
+            <a:avLst/>
+          </a:prstGeom>
+        </p:spPr>
+      </p:pic>
+      <p:pic>
+        <p:nvPicPr>
+          <p:cNvPr id="4" name="Picture 3"/>
+          <p:cNvPicPr>
+            <a:picLocks noChangeAspect="1"/>
+          </p:cNvPicPr>
+          <p:nvPr/>
+        </p:nvPicPr>
+        <p:blipFill>
+          <a:blip r:embed="rId3"/>
+          <a:stretch>
+            <a:fillRect/>
+          </a:stretch>
+        </p:blipFill>
+        <p:spPr>
+          <a:xfrm>
+            <a:off x="2884800" y="294818"/>
+            <a:ext cx="5699524" cy="3117249"/>
+          </a:xfrm>
+          <a:prstGeom prst="rect">
+            <a:avLst/>
+          </a:prstGeom>
+        </p:spPr>
+      </p:pic>
+    </p:spTree>
+    <p:extLst>
+      <p:ext uri="{BB962C8B-B14F-4D97-AF65-F5344CB8AC3E}">
+        <p14:creationId xmlns:p14="http://schemas.microsoft.com/office/powerpoint/2010/main" val="2330418393"/>
+      </p:ext>
+    </p:extLst>
+  </p:cSld>
+  <p:clrMapOvr>
+    <a:masterClrMapping/>
+  </p:clrMapOvr>
+</p:sld>
+</file>
+
 <file path=ppt/theme/theme1.xml><?xml version="1.0" encoding="utf-8"?>
 <a:theme xmlns:a="http://schemas.openxmlformats.org/drawingml/2006/main" name="Office Theme">
   <a:themeElements>
@@ -3784,4 +4036,265 @@
     </a:ext>
   </a:extLst>
 </a:theme>
+</file>
+
+<file path=ppt/theme/theme2.xml><?xml version="1.0" encoding="utf-8"?>
+<a:theme xmlns:a="http://schemas.openxmlformats.org/drawingml/2006/main" name="Office Theme">
+  <a:themeElements>
+    <a:clrScheme name="Office">
+      <a:dk1>
+        <a:sysClr val="windowText" lastClr="000000"/>
+      </a:dk1>
+      <a:lt1>
+        <a:sysClr val="window" lastClr="FFFFFF"/>
+      </a:lt1>
+      <a:dk2>
+        <a:srgbClr val="44546A"/>
+      </a:dk2>
+      <a:lt2>
+        <a:srgbClr val="E7E6E6"/>
+      </a:lt2>
+      <a:accent1>
+        <a:srgbClr val="5B9BD5"/>
+      </a:accent1>
+      <a:accent2>
+        <a:srgbClr val="ED7D31"/>
+      </a:accent2>
+      <a:accent3>
+        <a:srgbClr val="A5A5A5"/>
+      </a:accent3>
+      <a:accent4>
+        <a:srgbClr val="FFC000"/>
+      </a:accent4>
+      <a:accent5>
+        <a:srgbClr val="4472C4"/>
+      </a:accent5>
+      <a:accent6>
+        <a:srgbClr val="70AD47"/>
+      </a:accent6>
+      <a:hlink>
+        <a:srgbClr val="0563C1"/>
+      </a:hlink>
+      <a:folHlink>
+        <a:srgbClr val="954F72"/>
+      </a:folHlink>
+    </a:clrScheme>
+    <a:fontScheme name="Office">
+      <a:majorFont>
+        <a:latin typeface="Calibri Light" panose="020F0302020204030204"/>
+        <a:ea typeface=""/>
+        <a:cs typeface=""/>
+        <a:font script="Jpan" typeface="ＭＳ Ｐゴシック"/>
+        <a:font script="Hang" typeface="맑은 고딕"/>
+        <a:font script="Hans" typeface="宋体"/>
+        <a:font script="Hant" typeface="新細明體"/>
+        <a:font script="Arab" typeface="Times New Roman"/>
+        <a:font script="Hebr" typeface="Times New Roman"/>
+        <a:font script="Thai" typeface="Angsana New"/>
+        <a:font script="Ethi" typeface="Nyala"/>
+        <a:font script="Beng" typeface="Vrinda"/>
+        <a:font script="Gujr" typeface="Shruti"/>
+        <a:font script="Khmr" typeface="MoolBoran"/>
+        <a:font script="Knda" typeface="Tunga"/>
+        <a:font script="Guru" typeface="Raavi"/>
+        <a:font script="Cans" typeface="Euphemia"/>
+        <a:font script="Cher" typeface="Plantagenet Cherokee"/>
+        <a:font script="Yiii" typeface="Microsoft Yi Baiti"/>
+        <a:font script="Tibt" typeface="Microsoft Himalaya"/>
+        <a:font script="Thaa" typeface="MV Boli"/>
+        <a:font script="Deva" typeface="Mangal"/>
+        <a:font script="Telu" typeface="Gautami"/>
+        <a:font script="Taml" typeface="Latha"/>
+        <a:font script="Syrc" typeface="Estrangelo Edessa"/>
+        <a:font script="Orya" typeface="Kalinga"/>
+        <a:font script="Mlym" typeface="Kartika"/>
+        <a:font script="Laoo" typeface="DokChampa"/>
+        <a:font script="Sinh" typeface="Iskoola Pota"/>
+        <a:font script="Mong" typeface="Mongolian Baiti"/>
+        <a:font script="Viet" typeface="Times New Roman"/>
+        <a:font script="Uigh" typeface="Microsoft Uighur"/>
+        <a:font script="Geor" typeface="Sylfaen"/>
+      </a:majorFont>
+      <a:minorFont>
+        <a:latin typeface="Calibri" panose="020F0502020204030204"/>
+        <a:ea typeface=""/>
+        <a:cs typeface=""/>
+        <a:font script="Jpan" typeface="ＭＳ Ｐゴシック"/>
+        <a:font script="Hang" typeface="맑은 고딕"/>
+        <a:font script="Hans" typeface="宋体"/>
+        <a:font script="Hant" typeface="新細明體"/>
+        <a:font script="Arab" typeface="Arial"/>
+        <a:font script="Hebr" typeface="Arial"/>
+        <a:font script="Thai" typeface="Cordia New"/>
+        <a:font script="Ethi" typeface="Nyala"/>
+        <a:font script="Beng" typeface="Vrinda"/>
+        <a:font script="Gujr" typeface="Shruti"/>
+        <a:font script="Khmr" typeface="DaunPenh"/>
+        <a:font script="Knda" typeface="Tunga"/>
+        <a:font script="Guru" typeface="Raavi"/>
+        <a:font script="Cans" typeface="Euphemia"/>
+        <a:font script="Cher" typeface="Plantagenet Cherokee"/>
+        <a:font script="Yiii" typeface="Microsoft Yi Baiti"/>
+        <a:font script="Tibt" typeface="Microsoft Himalaya"/>
+        <a:font script="Thaa" typeface="MV Boli"/>
+        <a:font script="Deva" typeface="Mangal"/>
+        <a:font script="Telu" typeface="Gautami"/>
+        <a:font script="Taml" typeface="Latha"/>
+        <a:font script="Syrc" typeface="Estrangelo Edessa"/>
+        <a:font script="Orya" typeface="Kalinga"/>
+        <a:font script="Mlym" typeface="Kartika"/>
+        <a:font script="Laoo" typeface="DokChampa"/>
+        <a:font script="Sinh" typeface="Iskoola Pota"/>
+        <a:font script="Mong" typeface="Mongolian Baiti"/>
+        <a:font script="Viet" typeface="Arial"/>
+        <a:font script="Uigh" typeface="Microsoft Uighur"/>
+        <a:font script="Geor" typeface="Sylfaen"/>
+      </a:minorFont>
+    </a:fontScheme>
+    <a:fmtScheme name="Office">
+      <a:fillStyleLst>
+        <a:solidFill>
+          <a:schemeClr val="phClr"/>
+        </a:solidFill>
+        <a:gradFill rotWithShape="1">
+          <a:gsLst>
+            <a:gs pos="0">
+              <a:schemeClr val="phClr">
+                <a:lumMod val="110000"/>
+                <a:satMod val="105000"/>
+                <a:tint val="67000"/>
+              </a:schemeClr>
+            </a:gs>
+            <a:gs pos="50000">
+              <a:schemeClr val="phClr">
+                <a:lumMod val="105000"/>
+                <a:satMod val="103000"/>
+                <a:tint val="73000"/>
+              </a:schemeClr>
+            </a:gs>
+            <a:gs pos="100000">
+              <a:schemeClr val="phClr">
+                <a:lumMod val="105000"/>
+                <a:satMod val="109000"/>
+                <a:tint val="81000"/>
+              </a:schemeClr>
+            </a:gs>
+          </a:gsLst>
+          <a:lin ang="5400000" scaled="0"/>
+        </a:gradFill>
+        <a:gradFill rotWithShape="1">
+          <a:gsLst>
+            <a:gs pos="0">
+              <a:schemeClr val="phClr">
+                <a:satMod val="103000"/>
+                <a:lumMod val="102000"/>
+                <a:tint val="94000"/>
+              </a:schemeClr>
+            </a:gs>
+            <a:gs pos="50000">
+              <a:schemeClr val="phClr">
+                <a:satMod val="110000"/>
+                <a:lumMod val="100000"/>
+                <a:shade val="100000"/>
+              </a:schemeClr>
+            </a:gs>
+            <a:gs pos="100000">
+              <a:schemeClr val="phClr">
+                <a:lumMod val="99000"/>
+                <a:satMod val="120000"/>
+                <a:shade val="78000"/>
+              </a:schemeClr>
+            </a:gs>
+          </a:gsLst>
+          <a:lin ang="5400000" scaled="0"/>
+        </a:gradFill>
+      </a:fillStyleLst>
+      <a:lnStyleLst>
+        <a:ln w="6350" cap="flat" cmpd="sng" algn="ctr">
+          <a:solidFill>
+            <a:schemeClr val="phClr"/>
+          </a:solidFill>
+          <a:prstDash val="solid"/>
+          <a:miter lim="800000"/>
+        </a:ln>
+        <a:ln w="12700" cap="flat" cmpd="sng" algn="ctr">
+          <a:solidFill>
+            <a:schemeClr val="phClr"/>
+          </a:solidFill>
+          <a:prstDash val="solid"/>
+          <a:miter lim="800000"/>
+        </a:ln>
+        <a:ln w="19050" cap="flat" cmpd="sng" algn="ctr">
+          <a:solidFill>
+            <a:schemeClr val="phClr"/>
+          </a:solidFill>
+          <a:prstDash val="solid"/>
+          <a:miter lim="800000"/>
+        </a:ln>
+      </a:lnStyleLst>
+      <a:effectStyleLst>
+        <a:effectStyle>
+          <a:effectLst/>
+        </a:effectStyle>
+        <a:effectStyle>
+          <a:effectLst/>
+        </a:effectStyle>
+        <a:effectStyle>
+          <a:effectLst>
+            <a:outerShdw blurRad="57150" dist="19050" dir="5400000" algn="ctr" rotWithShape="0">
+              <a:srgbClr val="000000">
+                <a:alpha val="63000"/>
+              </a:srgbClr>
+            </a:outerShdw>
+          </a:effectLst>
+        </a:effectStyle>
+      </a:effectStyleLst>
+      <a:bgFillStyleLst>
+        <a:solidFill>
+          <a:schemeClr val="phClr"/>
+        </a:solidFill>
+        <a:solidFill>
+          <a:schemeClr val="phClr">
+            <a:tint val="95000"/>
+            <a:satMod val="170000"/>
+          </a:schemeClr>
+        </a:solidFill>
+        <a:gradFill rotWithShape="1">
+          <a:gsLst>
+            <a:gs pos="0">
+              <a:schemeClr val="phClr">
+                <a:tint val="93000"/>
+                <a:satMod val="150000"/>
+                <a:shade val="98000"/>
+                <a:lumMod val="102000"/>
+              </a:schemeClr>
+            </a:gs>
+            <a:gs pos="50000">
+              <a:schemeClr val="phClr">
+                <a:tint val="98000"/>
+                <a:satMod val="130000"/>
+                <a:shade val="90000"/>
+                <a:lumMod val="103000"/>
+              </a:schemeClr>
+            </a:gs>
+            <a:gs pos="100000">
+              <a:schemeClr val="phClr">
+                <a:shade val="63000"/>
+                <a:satMod val="120000"/>
+              </a:schemeClr>
+            </a:gs>
+          </a:gsLst>
+          <a:lin ang="5400000" scaled="0"/>
+        </a:gradFill>
+      </a:bgFillStyleLst>
+    </a:fmtScheme>
+  </a:themeElements>
+  <a:objectDefaults/>
+  <a:extraClrSchemeLst/>
+  <a:extLst>
+    <a:ext uri="{05A4C25C-085E-4340-85A3-A5531E510DB2}">
+      <thm15:themeFamily xmlns:thm15="http://schemas.microsoft.com/office/thememl/2012/main" name="Office Theme" id="{62F939B6-93AF-4DB8-9C6B-D6C7DFDC589F}" vid="{4A3C46E8-61CC-4603-A589-7422A47A8E4A}"/>
+    </a:ext>
+  </a:extLst>
+</a:theme>
 </file>
</xml_diff>